<commit_message>
Add supplemental resources per class promise
</commit_message>
<xml_diff>
--- a/warner-cs-AZ104.pptx
+++ b/warner-cs-AZ104.pptx
@@ -21,8 +21,8 @@
     <p:sldId id="2076137125" r:id="rId12"/>
     <p:sldId id="2076137126" r:id="rId13"/>
     <p:sldId id="2076137127" r:id="rId14"/>
-    <p:sldId id="2076137128" r:id="rId15"/>
-    <p:sldId id="4987" r:id="rId16"/>
+    <p:sldId id="4987" r:id="rId15"/>
+    <p:sldId id="2076137128" r:id="rId16"/>
     <p:sldId id="4997" r:id="rId17"/>
     <p:sldId id="4998" r:id="rId18"/>
     <p:sldId id="5000" r:id="rId19"/>
@@ -185,8 +185,8 @@
         <p14:section name="SLIDES" id="{94E4BC8D-4C6B-497C-AF0B-DB8F23016922}">
           <p14:sldIdLst>
             <p14:sldId id="2076137127"/>
+            <p14:sldId id="4987"/>
             <p14:sldId id="2076137128"/>
-            <p14:sldId id="4987"/>
             <p14:sldId id="4997"/>
             <p14:sldId id="4998"/>
             <p14:sldId id="5000"/>
@@ -7843,17 +7843,17 @@
           <a:p>
             <a:r>
               <a:rPr lang="en-US" dirty="0"/>
-              <a:t>Availability Set</a:t>
+              <a:t>Availability Zone</a:t>
             </a:r>
           </a:p>
         </p:txBody>
       </p:sp>
       <p:pic>
         <p:nvPicPr>
-          <p:cNvPr id="5122" name="Picture 2" descr="Image result for azure availability set">
-            <a:extLst>
-              <a:ext uri="{FF2B5EF4-FFF2-40B4-BE49-F238E27FC236}">
-                <a16:creationId xmlns:a16="http://schemas.microsoft.com/office/drawing/2014/main" id="{23D438E9-59A9-4A0B-A2A6-1F7E19B2A866}"/>
+          <p:cNvPr id="6146" name="Picture 2" descr="Image result for azure availability zone">
+            <a:extLst>
+              <a:ext uri="{FF2B5EF4-FFF2-40B4-BE49-F238E27FC236}">
+                <a16:creationId xmlns:a16="http://schemas.microsoft.com/office/drawing/2014/main" id="{0C5E5CBD-3FA2-4B2E-8D50-7302EB7082B4}"/>
               </a:ext>
             </a:extLst>
           </p:cNvPr>
@@ -7877,8 +7877,8 @@
         </p:blipFill>
         <p:spPr bwMode="auto">
           <a:xfrm>
-            <a:off x="1979602" y="989581"/>
-            <a:ext cx="5184798" cy="3406618"/>
+            <a:off x="2510131" y="905526"/>
+            <a:ext cx="4123739" cy="3544371"/>
           </a:xfrm>
           <a:prstGeom prst="rect">
             <a:avLst/>
@@ -7900,7 +7900,7 @@
           <p:cNvPr id="3" name="Picture 2">
             <a:extLst>
               <a:ext uri="{FF2B5EF4-FFF2-40B4-BE49-F238E27FC236}">
-                <a16:creationId xmlns:a16="http://schemas.microsoft.com/office/drawing/2014/main" id="{2D08BB08-0261-44D3-B78A-67BF7EC63ADD}"/>
+                <a16:creationId xmlns:a16="http://schemas.microsoft.com/office/drawing/2014/main" id="{8B3A2702-2F5E-4EF6-85E6-7A0037D449AB}"/>
               </a:ext>
             </a:extLst>
           </p:cNvPr>
@@ -7928,7 +7928,7 @@
     </p:spTree>
     <p:extLst>
       <p:ext uri="{BB962C8B-B14F-4D97-AF65-F5344CB8AC3E}">
-        <p14:creationId xmlns:p14="http://schemas.microsoft.com/office/powerpoint/2010/main" val="3434276759"/>
+        <p14:creationId xmlns:p14="http://schemas.microsoft.com/office/powerpoint/2010/main" val="2395041363"/>
       </p:ext>
     </p:extLst>
   </p:cSld>
@@ -7978,17 +7978,17 @@
           <a:p>
             <a:r>
               <a:rPr lang="en-US" dirty="0"/>
-              <a:t>Availability Zone</a:t>
+              <a:t>Availability Set</a:t>
             </a:r>
           </a:p>
         </p:txBody>
       </p:sp>
       <p:pic>
         <p:nvPicPr>
-          <p:cNvPr id="6146" name="Picture 2" descr="Image result for azure availability zone">
-            <a:extLst>
-              <a:ext uri="{FF2B5EF4-FFF2-40B4-BE49-F238E27FC236}">
-                <a16:creationId xmlns:a16="http://schemas.microsoft.com/office/drawing/2014/main" id="{0C5E5CBD-3FA2-4B2E-8D50-7302EB7082B4}"/>
+          <p:cNvPr id="5122" name="Picture 2" descr="Image result for azure availability set">
+            <a:extLst>
+              <a:ext uri="{FF2B5EF4-FFF2-40B4-BE49-F238E27FC236}">
+                <a16:creationId xmlns:a16="http://schemas.microsoft.com/office/drawing/2014/main" id="{23D438E9-59A9-4A0B-A2A6-1F7E19B2A866}"/>
               </a:ext>
             </a:extLst>
           </p:cNvPr>
@@ -8012,8 +8012,8 @@
         </p:blipFill>
         <p:spPr bwMode="auto">
           <a:xfrm>
-            <a:off x="2510131" y="905526"/>
-            <a:ext cx="4123739" cy="3544371"/>
+            <a:off x="1979602" y="989581"/>
+            <a:ext cx="5184798" cy="3406618"/>
           </a:xfrm>
           <a:prstGeom prst="rect">
             <a:avLst/>
@@ -8035,7 +8035,7 @@
           <p:cNvPr id="3" name="Picture 2">
             <a:extLst>
               <a:ext uri="{FF2B5EF4-FFF2-40B4-BE49-F238E27FC236}">
-                <a16:creationId xmlns:a16="http://schemas.microsoft.com/office/drawing/2014/main" id="{8B3A2702-2F5E-4EF6-85E6-7A0037D449AB}"/>
+                <a16:creationId xmlns:a16="http://schemas.microsoft.com/office/drawing/2014/main" id="{2D08BB08-0261-44D3-B78A-67BF7EC63ADD}"/>
               </a:ext>
             </a:extLst>
           </p:cNvPr>
@@ -8063,7 +8063,7 @@
     </p:spTree>
     <p:extLst>
       <p:ext uri="{BB962C8B-B14F-4D97-AF65-F5344CB8AC3E}">
-        <p14:creationId xmlns:p14="http://schemas.microsoft.com/office/powerpoint/2010/main" val="2395041363"/>
+        <p14:creationId xmlns:p14="http://schemas.microsoft.com/office/powerpoint/2010/main" val="3434276759"/>
       </p:ext>
     </p:extLst>
   </p:cSld>

</xml_diff>